<commit_message>
add print info to slide deck
</commit_message>
<xml_diff>
--- a/Sudoku.pptx
+++ b/Sudoku.pptx
@@ -1839,12 +1839,12 @@
   </dgm:ptLst>
   <dgm:cxnLst>
     <dgm:cxn modelId="{52ED2358-A56E-4449-B3F0-18C858F0752F}" srcId="{C089F704-365A-4E62-B903-80402E7382F5}" destId="{3F1A4614-0C2D-4795-97C7-3CF7B8F5AA33}" srcOrd="0" destOrd="0" parTransId="{DCA2CFDC-C037-4686-9C6D-B678401F07AF}" sibTransId="{BB1B20F8-DB15-4F59-8787-7A01FF9852B1}"/>
-    <dgm:cxn modelId="{ADCC9C2F-3A5E-4E00-8C49-26C61955E8B3}" type="presOf" srcId="{3F1A4614-0C2D-4795-97C7-3CF7B8F5AA33}" destId="{2CE9FA9E-EA59-4433-8B4F-3BF773C8C301}" srcOrd="1" destOrd="0" presId="urn:microsoft.com/office/officeart/2005/8/layout/venn1"/>
-    <dgm:cxn modelId="{8789FA50-4D15-4ACF-903F-A068CE6CA9AB}" type="presOf" srcId="{3F1A4614-0C2D-4795-97C7-3CF7B8F5AA33}" destId="{F6AA7A9C-C1F2-4C3B-9806-B909BE5C0E9B}" srcOrd="0" destOrd="0" presId="urn:microsoft.com/office/officeart/2005/8/layout/venn1"/>
     <dgm:cxn modelId="{B3B3B4CE-B74F-4B83-A144-6CFA1ADE2836}" srcId="{C089F704-365A-4E62-B903-80402E7382F5}" destId="{376DA762-2BC9-4717-9049-8422BA8A7AE5}" srcOrd="1" destOrd="0" parTransId="{9A2B3D67-01C3-4E8E-8ED2-7362A403878A}" sibTransId="{076B0914-4713-4A7F-8AC9-4388BAF13780}"/>
     <dgm:cxn modelId="{D3A5C80B-BCF1-4A01-9FB4-FE4D6867E716}" type="presOf" srcId="{376DA762-2BC9-4717-9049-8422BA8A7AE5}" destId="{C0BC41AC-5B3D-4B7A-BFD0-EB7A13B4BEFA}" srcOrd="0" destOrd="0" presId="urn:microsoft.com/office/officeart/2005/8/layout/venn1"/>
+    <dgm:cxn modelId="{E20122FF-C146-484F-BCBB-32A935753452}" type="presOf" srcId="{C089F704-365A-4E62-B903-80402E7382F5}" destId="{65387658-C8A7-4786-8267-A50B772ADB5B}" srcOrd="0" destOrd="0" presId="urn:microsoft.com/office/officeart/2005/8/layout/venn1"/>
     <dgm:cxn modelId="{248F7C28-2840-4918-B137-C25E6459177C}" type="presOf" srcId="{376DA762-2BC9-4717-9049-8422BA8A7AE5}" destId="{0D67AF05-784A-41B0-8D14-34044998D3D5}" srcOrd="1" destOrd="0" presId="urn:microsoft.com/office/officeart/2005/8/layout/venn1"/>
-    <dgm:cxn modelId="{E20122FF-C146-484F-BCBB-32A935753452}" type="presOf" srcId="{C089F704-365A-4E62-B903-80402E7382F5}" destId="{65387658-C8A7-4786-8267-A50B772ADB5B}" srcOrd="0" destOrd="0" presId="urn:microsoft.com/office/officeart/2005/8/layout/venn1"/>
+    <dgm:cxn modelId="{8789FA50-4D15-4ACF-903F-A068CE6CA9AB}" type="presOf" srcId="{3F1A4614-0C2D-4795-97C7-3CF7B8F5AA33}" destId="{F6AA7A9C-C1F2-4C3B-9806-B909BE5C0E9B}" srcOrd="0" destOrd="0" presId="urn:microsoft.com/office/officeart/2005/8/layout/venn1"/>
+    <dgm:cxn modelId="{ADCC9C2F-3A5E-4E00-8C49-26C61955E8B3}" type="presOf" srcId="{3F1A4614-0C2D-4795-97C7-3CF7B8F5AA33}" destId="{2CE9FA9E-EA59-4433-8B4F-3BF773C8C301}" srcOrd="1" destOrd="0" presId="urn:microsoft.com/office/officeart/2005/8/layout/venn1"/>
     <dgm:cxn modelId="{564D95B6-01CB-4AA2-B439-DF12C150CB9A}" type="presParOf" srcId="{65387658-C8A7-4786-8267-A50B772ADB5B}" destId="{F6AA7A9C-C1F2-4C3B-9806-B909BE5C0E9B}" srcOrd="0" destOrd="0" presId="urn:microsoft.com/office/officeart/2005/8/layout/venn1"/>
     <dgm:cxn modelId="{861FFC22-E9B6-47F9-BB05-CC91B739CE96}" type="presParOf" srcId="{65387658-C8A7-4786-8267-A50B772ADB5B}" destId="{2CE9FA9E-EA59-4433-8B4F-3BF773C8C301}" srcOrd="1" destOrd="0" presId="urn:microsoft.com/office/officeart/2005/8/layout/venn1"/>
     <dgm:cxn modelId="{A3296BDC-0477-4FB0-A9D1-EFD7719D4066}" type="presParOf" srcId="{65387658-C8A7-4786-8267-A50B772ADB5B}" destId="{C0BC41AC-5B3D-4B7A-BFD0-EB7A13B4BEFA}" srcOrd="2" destOrd="0" presId="urn:microsoft.com/office/officeart/2005/8/layout/venn1"/>
@@ -2034,9 +2034,9 @@
   </dgm:ptLst>
   <dgm:cxnLst>
     <dgm:cxn modelId="{B3B3B4CE-B74F-4B83-A144-6CFA1ADE2836}" srcId="{C089F704-365A-4E62-B903-80402E7382F5}" destId="{376DA762-2BC9-4717-9049-8422BA8A7AE5}" srcOrd="1" destOrd="0" parTransId="{9A2B3D67-01C3-4E8E-8ED2-7362A403878A}" sibTransId="{076B0914-4713-4A7F-8AC9-4388BAF13780}"/>
+    <dgm:cxn modelId="{52ED2358-A56E-4449-B3F0-18C858F0752F}" srcId="{C089F704-365A-4E62-B903-80402E7382F5}" destId="{3F1A4614-0C2D-4795-97C7-3CF7B8F5AA33}" srcOrd="0" destOrd="0" parTransId="{DCA2CFDC-C037-4686-9C6D-B678401F07AF}" sibTransId="{BB1B20F8-DB15-4F59-8787-7A01FF9852B1}"/>
+    <dgm:cxn modelId="{8510633E-62ED-443D-9375-5D2AEBC3169E}" type="presOf" srcId="{376DA762-2BC9-4717-9049-8422BA8A7AE5}" destId="{0D67AF05-784A-41B0-8D14-34044998D3D5}" srcOrd="1" destOrd="0" presId="urn:microsoft.com/office/officeart/2005/8/layout/venn1"/>
     <dgm:cxn modelId="{9A1524CE-B585-4871-8A74-2F7971DADF18}" type="presOf" srcId="{C089F704-365A-4E62-B903-80402E7382F5}" destId="{65387658-C8A7-4786-8267-A50B772ADB5B}" srcOrd="0" destOrd="0" presId="urn:microsoft.com/office/officeart/2005/8/layout/venn1"/>
-    <dgm:cxn modelId="{8510633E-62ED-443D-9375-5D2AEBC3169E}" type="presOf" srcId="{376DA762-2BC9-4717-9049-8422BA8A7AE5}" destId="{0D67AF05-784A-41B0-8D14-34044998D3D5}" srcOrd="1" destOrd="0" presId="urn:microsoft.com/office/officeart/2005/8/layout/venn1"/>
-    <dgm:cxn modelId="{52ED2358-A56E-4449-B3F0-18C858F0752F}" srcId="{C089F704-365A-4E62-B903-80402E7382F5}" destId="{3F1A4614-0C2D-4795-97C7-3CF7B8F5AA33}" srcOrd="0" destOrd="0" parTransId="{DCA2CFDC-C037-4686-9C6D-B678401F07AF}" sibTransId="{BB1B20F8-DB15-4F59-8787-7A01FF9852B1}"/>
     <dgm:cxn modelId="{BEF92491-E27B-479E-AA9C-107AFB64086C}" type="presOf" srcId="{376DA762-2BC9-4717-9049-8422BA8A7AE5}" destId="{C0BC41AC-5B3D-4B7A-BFD0-EB7A13B4BEFA}" srcOrd="0" destOrd="0" presId="urn:microsoft.com/office/officeart/2005/8/layout/venn1"/>
     <dgm:cxn modelId="{977D221C-7847-46C3-B7D3-8991525B30AF}" type="presOf" srcId="{3F1A4614-0C2D-4795-97C7-3CF7B8F5AA33}" destId="{2CE9FA9E-EA59-4433-8B4F-3BF773C8C301}" srcOrd="1" destOrd="0" presId="urn:microsoft.com/office/officeart/2005/8/layout/venn1"/>
     <dgm:cxn modelId="{AB48BCCE-A64A-4569-9838-653965F7737E}" type="presOf" srcId="{3F1A4614-0C2D-4795-97C7-3CF7B8F5AA33}" destId="{F6AA7A9C-C1F2-4C3B-9806-B909BE5C0E9B}" srcOrd="0" destOrd="0" presId="urn:microsoft.com/office/officeart/2005/8/layout/venn1"/>
@@ -6600,7 +6600,7 @@
           <a:p>
             <a:fld id="{920EFE2F-BB6B-4048-A85F-FFE34356521F}" type="datetimeFigureOut">
               <a:rPr lang="en-CA" smtClean="0"/>
-              <a:t>11/30/2017</a:t>
+              <a:t>2017-12-03</a:t>
             </a:fld>
             <a:endParaRPr lang="en-CA"/>
           </a:p>
@@ -6847,7 +6847,7 @@
           <a:p>
             <a:fld id="{920EFE2F-BB6B-4048-A85F-FFE34356521F}" type="datetimeFigureOut">
               <a:rPr lang="en-CA" smtClean="0"/>
-              <a:t>11/30/2017</a:t>
+              <a:t>2017-12-03</a:t>
             </a:fld>
             <a:endParaRPr lang="en-CA"/>
           </a:p>
@@ -7233,7 +7233,7 @@
           <a:p>
             <a:fld id="{920EFE2F-BB6B-4048-A85F-FFE34356521F}" type="datetimeFigureOut">
               <a:rPr lang="en-CA" smtClean="0"/>
-              <a:t>11/30/2017</a:t>
+              <a:t>2017-12-03</a:t>
             </a:fld>
             <a:endParaRPr lang="en-CA"/>
           </a:p>
@@ -7473,7 +7473,7 @@
           <a:p>
             <a:fld id="{920EFE2F-BB6B-4048-A85F-FFE34356521F}" type="datetimeFigureOut">
               <a:rPr lang="en-CA" smtClean="0"/>
-              <a:t>11/30/2017</a:t>
+              <a:t>2017-12-03</a:t>
             </a:fld>
             <a:endParaRPr lang="en-CA"/>
           </a:p>
@@ -7964,7 +7964,7 @@
           <a:p>
             <a:fld id="{920EFE2F-BB6B-4048-A85F-FFE34356521F}" type="datetimeFigureOut">
               <a:rPr lang="en-CA" smtClean="0"/>
-              <a:t>11/30/2017</a:t>
+              <a:t>2017-12-03</a:t>
             </a:fld>
             <a:endParaRPr lang="en-CA"/>
           </a:p>
@@ -8274,7 +8274,7 @@
           <a:p>
             <a:fld id="{920EFE2F-BB6B-4048-A85F-FFE34356521F}" type="datetimeFigureOut">
               <a:rPr lang="en-CA" smtClean="0"/>
-              <a:t>11/30/2017</a:t>
+              <a:t>2017-12-03</a:t>
             </a:fld>
             <a:endParaRPr lang="en-CA"/>
           </a:p>
@@ -8665,7 +8665,7 @@
           <a:p>
             <a:fld id="{920EFE2F-BB6B-4048-A85F-FFE34356521F}" type="datetimeFigureOut">
               <a:rPr lang="en-CA" smtClean="0"/>
-              <a:t>11/30/2017</a:t>
+              <a:t>2017-12-03</a:t>
             </a:fld>
             <a:endParaRPr lang="en-CA"/>
           </a:p>
@@ -8783,7 +8783,7 @@
           <a:p>
             <a:fld id="{920EFE2F-BB6B-4048-A85F-FFE34356521F}" type="datetimeFigureOut">
               <a:rPr lang="en-CA" smtClean="0"/>
-              <a:t>11/30/2017</a:t>
+              <a:t>2017-12-03</a:t>
             </a:fld>
             <a:endParaRPr lang="en-CA"/>
           </a:p>
@@ -8878,7 +8878,7 @@
           <a:p>
             <a:fld id="{920EFE2F-BB6B-4048-A85F-FFE34356521F}" type="datetimeFigureOut">
               <a:rPr lang="en-CA" smtClean="0"/>
-              <a:t>11/30/2017</a:t>
+              <a:t>2017-12-03</a:t>
             </a:fld>
             <a:endParaRPr lang="en-CA"/>
           </a:p>
@@ -9178,7 +9178,7 @@
           <a:p>
             <a:fld id="{920EFE2F-BB6B-4048-A85F-FFE34356521F}" type="datetimeFigureOut">
               <a:rPr lang="en-CA" smtClean="0"/>
-              <a:t>11/30/2017</a:t>
+              <a:t>2017-12-03</a:t>
             </a:fld>
             <a:endParaRPr lang="en-CA"/>
           </a:p>
@@ -9443,7 +9443,7 @@
           <a:p>
             <a:fld id="{920EFE2F-BB6B-4048-A85F-FFE34356521F}" type="datetimeFigureOut">
               <a:rPr lang="en-CA" smtClean="0"/>
-              <a:t>11/30/2017</a:t>
+              <a:t>2017-12-03</a:t>
             </a:fld>
             <a:endParaRPr lang="en-CA"/>
           </a:p>
@@ -9861,7 +9861,7 @@
           <a:p>
             <a:fld id="{920EFE2F-BB6B-4048-A85F-FFE34356521F}" type="datetimeFigureOut">
               <a:rPr lang="en-CA" smtClean="0"/>
-              <a:t>11/30/2017</a:t>
+              <a:t>2017-12-03</a:t>
             </a:fld>
             <a:endParaRPr lang="en-CA"/>
           </a:p>
@@ -13426,7 +13426,72 @@
           <a:bodyPr/>
           <a:lstStyle/>
           <a:p>
-            <a:endParaRPr lang="en-CA" dirty="0"/>
+            <a:pPr marL="457200" indent="-457200">
+              <a:buFont typeface="+mj-lt"/>
+              <a:buAutoNum type="alphaLcParenR"/>
+            </a:pPr>
+            <a:r>
+              <a:rPr lang="en-CA" dirty="0"/>
+              <a:t>Print the grid</a:t>
+            </a:r>
+          </a:p>
+          <a:p>
+            <a:pPr marL="457200" indent="-457200">
+              <a:buFont typeface="+mj-lt"/>
+              <a:buAutoNum type="alphaLcParenR"/>
+            </a:pPr>
+            <a:r>
+              <a:rPr lang="en-CA" dirty="0"/>
+              <a:t>Loop over each cell</a:t>
+            </a:r>
+          </a:p>
+          <a:p>
+            <a:pPr marL="859536" lvl="1" indent="-457200">
+              <a:buFont typeface="+mj-lt"/>
+              <a:buAutoNum type="romanLcPeriod"/>
+            </a:pPr>
+            <a:r>
+              <a:rPr lang="en-CA" dirty="0" smtClean="0"/>
+              <a:t>If </a:t>
+            </a:r>
+            <a:r>
+              <a:rPr lang="en-CA" dirty="0"/>
+              <a:t>the cell </a:t>
+            </a:r>
+            <a:r>
+              <a:rPr lang="en-CA" dirty="0" smtClean="0"/>
+              <a:t>contains an answer, </a:t>
+            </a:r>
+            <a:r>
+              <a:rPr lang="en-CA" dirty="0"/>
+              <a:t>print a big </a:t>
+            </a:r>
+            <a:r>
+              <a:rPr lang="en-CA" dirty="0" smtClean="0"/>
+              <a:t>number </a:t>
+            </a:r>
+            <a:r>
+              <a:rPr lang="en-CA" dirty="0"/>
+              <a:t>to the current location in the </a:t>
+            </a:r>
+            <a:r>
+              <a:rPr lang="en-CA" dirty="0" smtClean="0"/>
+              <a:t>grid (black if clue, red if the answer was found by us)</a:t>
+            </a:r>
+          </a:p>
+          <a:p>
+            <a:pPr marL="859536" lvl="1" indent="-457200">
+              <a:buFont typeface="+mj-lt"/>
+              <a:buAutoNum type="romanLcPeriod"/>
+            </a:pPr>
+            <a:r>
+              <a:rPr lang="en-CA" dirty="0" smtClean="0"/>
+              <a:t>If the cell has multiple possibilities, print those numbers to </a:t>
+            </a:r>
+            <a:r>
+              <a:rPr lang="en-CA" smtClean="0"/>
+              <a:t>the cell as “notes”</a:t>
+            </a:r>
           </a:p>
         </p:txBody>
       </p:sp>
@@ -16054,6 +16119,46 @@
           <a:bodyPr/>
           <a:lstStyle/>
           <a:p>
+            <a:pPr marL="457200" indent="-457200">
+              <a:buFont typeface="+mj-lt"/>
+              <a:buAutoNum type="alphaLcParenR"/>
+            </a:pPr>
+            <a:r>
+              <a:rPr lang="en-CA" dirty="0" smtClean="0"/>
+              <a:t>Print the grid</a:t>
+            </a:r>
+          </a:p>
+          <a:p>
+            <a:pPr marL="457200" indent="-457200">
+              <a:buFont typeface="+mj-lt"/>
+              <a:buAutoNum type="alphaLcParenR"/>
+            </a:pPr>
+            <a:r>
+              <a:rPr lang="en-CA" dirty="0" smtClean="0"/>
+              <a:t>Loop over each cell</a:t>
+            </a:r>
+          </a:p>
+          <a:p>
+            <a:pPr marL="859536" lvl="1" indent="-457200">
+              <a:buFont typeface="+mj-lt"/>
+              <a:buAutoNum type="romanLcPeriod"/>
+            </a:pPr>
+            <a:r>
+              <a:rPr lang="en-CA" dirty="0" smtClean="0"/>
+              <a:t>if </a:t>
+            </a:r>
+            <a:r>
+              <a:rPr lang="en-CA" dirty="0"/>
+              <a:t>the cell contains a </a:t>
+            </a:r>
+            <a:r>
+              <a:rPr lang="en-CA" dirty="0" smtClean="0"/>
+              <a:t>clue, p</a:t>
+            </a:r>
+            <a:r>
+              <a:rPr lang="en-CA" dirty="0" smtClean="0"/>
+              <a:t>rint a big black number to the current location in the grid</a:t>
+            </a:r>
             <a:endParaRPr lang="en-CA" dirty="0"/>
           </a:p>
         </p:txBody>

</xml_diff>